<commit_message>
changed citations and figures
</commit_message>
<xml_diff>
--- a/fig/figure.pptx
+++ b/fig/figure.pptx
@@ -5400,7 +5400,7 @@
         <p:spPr>
           <a:xfrm>
             <a:off x="5844995" y="276051"/>
-            <a:ext cx="2703384" cy="830997"/>
+            <a:ext cx="3226364" cy="830997"/>
           </a:xfrm>
           <a:prstGeom prst="rect">
             <a:avLst/>
@@ -5414,35 +5414,43 @@
           <a:lstStyle/>
           <a:p>
             <a:r>
-              <a:rPr kumimoji="1" lang="ja-JP" altLang="en-US" sz="2400" dirty="0" smtClean="0">
+              <a:rPr lang="ja-JP" altLang="en-US" sz="2400" dirty="0">
                 <a:solidFill>
                   <a:srgbClr val="0000FF"/>
                 </a:solidFill>
               </a:rPr>
-              <a:t>取り出しだいものは</a:t>
-            </a:r>
-            <a:endParaRPr lang="en-US" altLang="ja-JP" sz="2400" dirty="0">
-              <a:solidFill>
-                <a:srgbClr val="0000FF"/>
-              </a:solidFill>
-            </a:endParaRPr>
-          </a:p>
-          <a:p>
+              <a:t>抽出対象となる知識</a:t>
+            </a:r>
             <a:r>
               <a:rPr lang="ja-JP" altLang="en-US" sz="2400" dirty="0" smtClean="0">
                 <a:solidFill>
                   <a:srgbClr val="0000FF"/>
                 </a:solidFill>
               </a:rPr>
-              <a:t>ありとあらゆる</a:t>
-            </a:r>
+              <a:t>・</a:t>
+            </a:r>
+            <a:endParaRPr lang="en-US" altLang="ja-JP" sz="2400" dirty="0" smtClean="0">
+              <a:solidFill>
+                <a:srgbClr val="0000FF"/>
+              </a:solidFill>
+            </a:endParaRPr>
+          </a:p>
+          <a:p>
             <a:r>
               <a:rPr lang="ja-JP" altLang="en-US" sz="2400" dirty="0" smtClean="0">
                 <a:solidFill>
                   <a:srgbClr val="0000FF"/>
                 </a:solidFill>
               </a:rPr>
-              <a:t>種類</a:t>
+              <a:t>情報</a:t>
+            </a:r>
+            <a:r>
+              <a:rPr lang="ja-JP" altLang="en-US" sz="2400" dirty="0">
+                <a:solidFill>
+                  <a:srgbClr val="0000FF"/>
+                </a:solidFill>
+              </a:rPr>
+              <a:t>は極めて多種多様</a:t>
             </a:r>
             <a:endParaRPr kumimoji="1" lang="ja-JP" altLang="en-US" sz="2400" dirty="0">
               <a:solidFill>

</xml_diff>

<commit_message>
revise comments in Figure 1
</commit_message>
<xml_diff>
--- a/fig/figure.pptx
+++ b/fig/figure.pptx
@@ -290,7 +290,7 @@
           <a:p>
             <a:fld id="{AC850509-64E3-E24B-9F03-8F6E4006AC67}" type="datetimeFigureOut">
               <a:rPr kumimoji="1" lang="ja-JP" altLang="en-US" smtClean="0"/>
-              <a:t>2016/02/19</a:t>
+              <a:t>2016/02/20</a:t>
             </a:fld>
             <a:endParaRPr kumimoji="1" lang="ja-JP" altLang="en-US"/>
           </a:p>
@@ -492,7 +492,7 @@
           <a:p>
             <a:fld id="{AC850509-64E3-E24B-9F03-8F6E4006AC67}" type="datetimeFigureOut">
               <a:rPr kumimoji="1" lang="ja-JP" altLang="en-US" smtClean="0"/>
-              <a:t>2016/02/19</a:t>
+              <a:t>2016/02/20</a:t>
             </a:fld>
             <a:endParaRPr kumimoji="1" lang="ja-JP" altLang="en-US"/>
           </a:p>
@@ -704,7 +704,7 @@
           <a:p>
             <a:fld id="{AC850509-64E3-E24B-9F03-8F6E4006AC67}" type="datetimeFigureOut">
               <a:rPr kumimoji="1" lang="ja-JP" altLang="en-US" smtClean="0"/>
-              <a:t>2016/02/19</a:t>
+              <a:t>2016/02/20</a:t>
             </a:fld>
             <a:endParaRPr kumimoji="1" lang="ja-JP" altLang="en-US"/>
           </a:p>
@@ -906,7 +906,7 @@
           <a:p>
             <a:fld id="{AC850509-64E3-E24B-9F03-8F6E4006AC67}" type="datetimeFigureOut">
               <a:rPr kumimoji="1" lang="ja-JP" altLang="en-US" smtClean="0"/>
-              <a:t>2016/02/19</a:t>
+              <a:t>2016/02/20</a:t>
             </a:fld>
             <a:endParaRPr kumimoji="1" lang="ja-JP" altLang="en-US"/>
           </a:p>
@@ -1152,7 +1152,7 @@
           <a:p>
             <a:fld id="{AC850509-64E3-E24B-9F03-8F6E4006AC67}" type="datetimeFigureOut">
               <a:rPr kumimoji="1" lang="ja-JP" altLang="en-US" smtClean="0"/>
-              <a:t>2016/02/19</a:t>
+              <a:t>2016/02/20</a:t>
             </a:fld>
             <a:endParaRPr kumimoji="1" lang="ja-JP" altLang="en-US"/>
           </a:p>
@@ -1504,7 +1504,7 @@
           <a:p>
             <a:fld id="{AC850509-64E3-E24B-9F03-8F6E4006AC67}" type="datetimeFigureOut">
               <a:rPr kumimoji="1" lang="ja-JP" altLang="en-US" smtClean="0"/>
-              <a:t>2016/02/19</a:t>
+              <a:t>2016/02/20</a:t>
             </a:fld>
             <a:endParaRPr kumimoji="1" lang="ja-JP" altLang="en-US"/>
           </a:p>
@@ -1990,7 +1990,7 @@
           <a:p>
             <a:fld id="{AC850509-64E3-E24B-9F03-8F6E4006AC67}" type="datetimeFigureOut">
               <a:rPr kumimoji="1" lang="ja-JP" altLang="en-US" smtClean="0"/>
-              <a:t>2016/02/19</a:t>
+              <a:t>2016/02/20</a:t>
             </a:fld>
             <a:endParaRPr kumimoji="1" lang="ja-JP" altLang="en-US"/>
           </a:p>
@@ -2108,7 +2108,7 @@
           <a:p>
             <a:fld id="{AC850509-64E3-E24B-9F03-8F6E4006AC67}" type="datetimeFigureOut">
               <a:rPr kumimoji="1" lang="ja-JP" altLang="en-US" smtClean="0"/>
-              <a:t>2016/02/19</a:t>
+              <a:t>2016/02/20</a:t>
             </a:fld>
             <a:endParaRPr kumimoji="1" lang="ja-JP" altLang="en-US"/>
           </a:p>
@@ -2203,7 +2203,7 @@
           <a:p>
             <a:fld id="{AC850509-64E3-E24B-9F03-8F6E4006AC67}" type="datetimeFigureOut">
               <a:rPr kumimoji="1" lang="ja-JP" altLang="en-US" smtClean="0"/>
-              <a:t>2016/02/19</a:t>
+              <a:t>2016/02/20</a:t>
             </a:fld>
             <a:endParaRPr kumimoji="1" lang="ja-JP" altLang="en-US"/>
           </a:p>
@@ -2512,7 +2512,7 @@
           <a:p>
             <a:fld id="{AC850509-64E3-E24B-9F03-8F6E4006AC67}" type="datetimeFigureOut">
               <a:rPr kumimoji="1" lang="ja-JP" altLang="en-US" smtClean="0"/>
-              <a:t>2016/02/19</a:t>
+              <a:t>2016/02/20</a:t>
             </a:fld>
             <a:endParaRPr kumimoji="1" lang="ja-JP" altLang="en-US"/>
           </a:p>
@@ -2765,7 +2765,7 @@
           <a:p>
             <a:fld id="{AC850509-64E3-E24B-9F03-8F6E4006AC67}" type="datetimeFigureOut">
               <a:rPr kumimoji="1" lang="ja-JP" altLang="en-US" smtClean="0"/>
-              <a:t>2016/02/19</a:t>
+              <a:t>2016/02/20</a:t>
             </a:fld>
             <a:endParaRPr kumimoji="1" lang="ja-JP" altLang="en-US"/>
           </a:p>
@@ -3010,7 +3010,7 @@
           <a:p>
             <a:fld id="{AC850509-64E3-E24B-9F03-8F6E4006AC67}" type="datetimeFigureOut">
               <a:rPr kumimoji="1" lang="ja-JP" altLang="en-US" smtClean="0"/>
-              <a:t>2016/02/19</a:t>
+              <a:t>2016/02/20</a:t>
             </a:fld>
             <a:endParaRPr kumimoji="1" lang="ja-JP" altLang="en-US"/>
           </a:p>
@@ -5272,22 +5272,14 @@
           <a:p>
             <a:r>
               <a:rPr kumimoji="1" lang="ja-JP" altLang="en-US" sz="2400" dirty="0" smtClean="0"/>
-              <a:t>ユーザの</a:t>
-            </a:r>
-            <a:r>
-              <a:rPr kumimoji="1" lang="ja-JP" altLang="en-US" sz="2400" dirty="0" smtClean="0"/>
-              <a:t>処理</a:t>
+              <a:t>ユーザの処理</a:t>
             </a:r>
             <a:endParaRPr kumimoji="1" lang="en-US" altLang="ja-JP" sz="2400" dirty="0" smtClean="0"/>
           </a:p>
           <a:p>
             <a:r>
               <a:rPr kumimoji="1" lang="en-US" altLang="ja-JP" sz="2400" dirty="0" smtClean="0"/>
-              <a:t> </a:t>
-            </a:r>
-            <a:r>
-              <a:rPr kumimoji="1" lang="en-US" altLang="ja-JP" sz="2400" dirty="0" smtClean="0"/>
-              <a:t>(</a:t>
+              <a:t> (</a:t>
             </a:r>
             <a:r>
               <a:rPr kumimoji="1" lang="ja-JP" altLang="en-US" sz="2400" dirty="0" smtClean="0"/>
@@ -5762,7 +5754,15 @@
           <a:p>
             <a:r>
               <a:rPr lang="ja-JP" altLang="en-US" sz="2000" dirty="0" smtClean="0"/>
-              <a:t>　　をうける必要</a:t>
+              <a:t>　　をうける</a:t>
+            </a:r>
+            <a:r>
+              <a:rPr lang="ja-JP" altLang="en-US" sz="2000" dirty="0" smtClean="0"/>
+              <a:t>必要</a:t>
+            </a:r>
+            <a:r>
+              <a:rPr lang="ja-JP" altLang="en-US" sz="2000" dirty="0" smtClean="0"/>
+              <a:t>がある</a:t>
             </a:r>
             <a:endParaRPr kumimoji="1" lang="ja-JP" altLang="en-US" sz="2000" dirty="0"/>
           </a:p>

</xml_diff>